<commit_message>
Update Duy & Garrett - Case Study 1.pptx
</commit_message>
<xml_diff>
--- a/Duy & Garrett - Case Study 1.pptx
+++ b/Duy & Garrett - Case Study 1.pptx
@@ -242,7 +242,7 @@
           <a:p>
             <a:fld id="{872BFC85-49E4-447A-A7E3-16153CB2FE2A}" type="datetimeFigureOut">
               <a:rPr lang="en-US" smtClean="0"/>
-              <a:t>3/3/2022</a:t>
+              <a:t>3/4/2022</a:t>
             </a:fld>
             <a:endParaRPr lang="en-US" dirty="0"/>
           </a:p>
@@ -419,7 +419,7 @@
           <a:p>
             <a:fld id="{1071B50E-4C60-4F9E-B773-52059170945B}" type="datetimeFigureOut">
               <a:rPr lang="en-US" noProof="0" smtClean="0"/>
-              <a:t>3/3/2022</a:t>
+              <a:t>3/4/2022</a:t>
             </a:fld>
             <a:endParaRPr lang="en-US" noProof="0" dirty="0"/>
           </a:p>
@@ -15515,6 +15515,41 @@
           <a:p>
             <a:pPr algn="ctr"/>
             <a:endParaRPr lang="en-US"/>
+          </a:p>
+        </p:txBody>
+      </p:sp>
+      <p:sp>
+        <p:nvSpPr>
+          <p:cNvPr id="2" name="TextBox 1">
+            <a:extLst>
+              <a:ext uri="{FF2B5EF4-FFF2-40B4-BE49-F238E27FC236}">
+                <a16:creationId xmlns:a16="http://schemas.microsoft.com/office/drawing/2014/main" id="{8BD0E48F-041A-4A7A-A075-337790519B19}"/>
+              </a:ext>
+            </a:extLst>
+          </p:cNvPr>
+          <p:cNvSpPr txBox="1"/>
+          <p:nvPr/>
+        </p:nvSpPr>
+        <p:spPr>
+          <a:xfrm>
+            <a:off x="764275" y="2272767"/>
+            <a:ext cx="4696094" cy="369332"/>
+          </a:xfrm>
+          <a:prstGeom prst="rect">
+            <a:avLst/>
+          </a:prstGeom>
+          <a:noFill/>
+        </p:spPr>
+        <p:txBody>
+          <a:bodyPr wrap="none" rtlCol="0">
+            <a:spAutoFit/>
+          </a:bodyPr>
+          <a:lstStyle/>
+          <a:p>
+            <a:r>
+              <a:rPr lang="en-US" dirty="0"/>
+              <a:t>Garrett Shankel - https://youtu.be/F2KTOjOjZYg </a:t>
+            </a:r>
           </a:p>
         </p:txBody>
       </p:sp>
@@ -23697,20 +23732,20 @@
 </file>
 
 <file path=customXml/item1.xml><?xml version="1.0" encoding="utf-8"?>
+<p:properties xmlns:p="http://schemas.microsoft.com/office/2006/metadata/properties" xmlns:xsi="http://www.w3.org/2001/XMLSchema-instance" xmlns:pc="http://schemas.microsoft.com/office/infopath/2007/PartnerControls">
+  <documentManagement>
+    <MediaServiceKeyPoints xmlns="71af3243-3dd4-4a8d-8c0d-dd76da1f02a5" xsi:nil="true"/>
+  </documentManagement>
+</p:properties>
+</file>
+
+<file path=customXml/item2.xml><?xml version="1.0" encoding="utf-8"?>
 <?mso-contentType ?>
 <FormTemplates xmlns="http://schemas.microsoft.com/sharepoint/v3/contenttype/forms">
   <Display>DocumentLibraryForm</Display>
   <Edit>DocumentLibraryForm</Edit>
   <New>DocumentLibraryForm</New>
 </FormTemplates>
-</file>
-
-<file path=customXml/item2.xml><?xml version="1.0" encoding="utf-8"?>
-<p:properties xmlns:p="http://schemas.microsoft.com/office/2006/metadata/properties" xmlns:xsi="http://www.w3.org/2001/XMLSchema-instance" xmlns:pc="http://schemas.microsoft.com/office/infopath/2007/PartnerControls">
-  <documentManagement>
-    <MediaServiceKeyPoints xmlns="71af3243-3dd4-4a8d-8c0d-dd76da1f02a5" xsi:nil="true"/>
-  </documentManagement>
-</p:properties>
 </file>
 
 <file path=customXml/item3.xml><?xml version="1.0" encoding="utf-8"?>
@@ -23925,19 +23960,19 @@
 </file>
 
 <file path=customXml/itemProps1.xml><?xml version="1.0" encoding="utf-8"?>
-<ds:datastoreItem xmlns:ds="http://schemas.openxmlformats.org/officeDocument/2006/customXml" ds:itemID="{A80A5AF1-8C57-4290-936E-5FD27C957251}">
+<ds:datastoreItem xmlns:ds="http://schemas.openxmlformats.org/officeDocument/2006/customXml" ds:itemID="{C87F4215-C6BB-44A3-9A5E-9446E6835900}">
   <ds:schemaRefs>
-    <ds:schemaRef ds:uri="http://schemas.microsoft.com/sharepoint/v3/contenttype/forms"/>
+    <ds:schemaRef ds:uri="http://schemas.microsoft.com/office/2006/metadata/properties"/>
+    <ds:schemaRef ds:uri="http://schemas.microsoft.com/office/infopath/2007/PartnerControls"/>
+    <ds:schemaRef ds:uri="71af3243-3dd4-4a8d-8c0d-dd76da1f02a5"/>
   </ds:schemaRefs>
 </ds:datastoreItem>
 </file>
 
 <file path=customXml/itemProps2.xml><?xml version="1.0" encoding="utf-8"?>
-<ds:datastoreItem xmlns:ds="http://schemas.openxmlformats.org/officeDocument/2006/customXml" ds:itemID="{C87F4215-C6BB-44A3-9A5E-9446E6835900}">
+<ds:datastoreItem xmlns:ds="http://schemas.openxmlformats.org/officeDocument/2006/customXml" ds:itemID="{A80A5AF1-8C57-4290-936E-5FD27C957251}">
   <ds:schemaRefs>
-    <ds:schemaRef ds:uri="http://schemas.microsoft.com/office/2006/metadata/properties"/>
-    <ds:schemaRef ds:uri="http://schemas.microsoft.com/office/infopath/2007/PartnerControls"/>
-    <ds:schemaRef ds:uri="71af3243-3dd4-4a8d-8c0d-dd76da1f02a5"/>
+    <ds:schemaRef ds:uri="http://schemas.microsoft.com/sharepoint/v3/contenttype/forms"/>
   </ds:schemaRefs>
 </ds:datastoreItem>
 </file>

</xml_diff>